<commit_message>
Minor update to figure 4
</commit_message>
<xml_diff>
--- a/Figure2.pptx
+++ b/Figure2.pptx
@@ -118,9 +118,78 @@
 <file path=ppt/revisionInfo.xml><?xml version="1.0" encoding="utf-8"?>
 <p1510:revInfo xmlns:a="http://schemas.openxmlformats.org/drawingml/2006/main" xmlns:r="http://schemas.openxmlformats.org/officeDocument/2006/relationships" xmlns:p1510="http://schemas.microsoft.com/office/powerpoint/2015/10/main">
   <p1510:revLst>
-    <p1510:client id="{AE5875B6-5082-4807-AC3A-E15EB414C0B2}" v="201" dt="2023-01-23T03:25:25.345"/>
+    <p1510:client id="{DE98530D-7C18-46D1-A921-E78294F9DADF}" v="2" dt="2023-04-03T06:38:39.199"/>
   </p1510:revLst>
 </p1510:revInfo>
+</file>
+
+<file path=ppt/changesInfos/changesInfo1.xml><?xml version="1.0" encoding="utf-8"?>
+<pc:chgInfo xmlns:a="http://schemas.openxmlformats.org/drawingml/2006/main" xmlns:r="http://schemas.openxmlformats.org/officeDocument/2006/relationships" xmlns:ac="http://schemas.microsoft.com/office/drawing/2013/main/command" xmlns:pc="http://schemas.microsoft.com/office/powerpoint/2013/main/command">
+  <pc:docChgLst>
+    <pc:chgData name="Rebecca Fisher" userId="dff23cd4-a77e-4150-9530-955e6070e532" providerId="ADAL" clId="{DE98530D-7C18-46D1-A921-E78294F9DADF}"/>
+    <pc:docChg chg="modSld">
+      <pc:chgData name="Rebecca Fisher" userId="dff23cd4-a77e-4150-9530-955e6070e532" providerId="ADAL" clId="{DE98530D-7C18-46D1-A921-E78294F9DADF}" dt="2023-04-03T06:39:46.627" v="24" actId="12788"/>
+      <pc:docMkLst>
+        <pc:docMk/>
+      </pc:docMkLst>
+      <pc:sldChg chg="modSp mod">
+        <pc:chgData name="Rebecca Fisher" userId="dff23cd4-a77e-4150-9530-955e6070e532" providerId="ADAL" clId="{DE98530D-7C18-46D1-A921-E78294F9DADF}" dt="2023-04-03T06:39:46.627" v="24" actId="12788"/>
+        <pc:sldMkLst>
+          <pc:docMk/>
+          <pc:sldMk cId="326879574" sldId="269"/>
+        </pc:sldMkLst>
+        <pc:spChg chg="mod">
+          <ac:chgData name="Rebecca Fisher" userId="dff23cd4-a77e-4150-9530-955e6070e532" providerId="ADAL" clId="{DE98530D-7C18-46D1-A921-E78294F9DADF}" dt="2023-04-03T06:38:56.631" v="19" actId="6549"/>
+          <ac:spMkLst>
+            <pc:docMk/>
+            <pc:sldMk cId="326879574" sldId="269"/>
+            <ac:spMk id="11" creationId="{AA1BDD6F-F11E-A657-DD93-E4D5FF6DDC4D}"/>
+          </ac:spMkLst>
+        </pc:spChg>
+        <pc:spChg chg="mod">
+          <ac:chgData name="Rebecca Fisher" userId="dff23cd4-a77e-4150-9530-955e6070e532" providerId="ADAL" clId="{DE98530D-7C18-46D1-A921-E78294F9DADF}" dt="2023-04-03T06:38:41.963" v="2" actId="20577"/>
+          <ac:spMkLst>
+            <pc:docMk/>
+            <pc:sldMk cId="326879574" sldId="269"/>
+            <ac:spMk id="132" creationId="{9B4310E1-18F2-4089-A585-BC88A2FD77E8}"/>
+          </ac:spMkLst>
+        </pc:spChg>
+        <pc:spChg chg="mod">
+          <ac:chgData name="Rebecca Fisher" userId="dff23cd4-a77e-4150-9530-955e6070e532" providerId="ADAL" clId="{DE98530D-7C18-46D1-A921-E78294F9DADF}" dt="2023-04-03T06:38:44.866" v="3" actId="20577"/>
+          <ac:spMkLst>
+            <pc:docMk/>
+            <pc:sldMk cId="326879574" sldId="269"/>
+            <ac:spMk id="138" creationId="{4B0D5F54-A23B-4C9F-9DB5-C8C6F118D66A}"/>
+          </ac:spMkLst>
+        </pc:spChg>
+        <pc:spChg chg="mod">
+          <ac:chgData name="Rebecca Fisher" userId="dff23cd4-a77e-4150-9530-955e6070e532" providerId="ADAL" clId="{DE98530D-7C18-46D1-A921-E78294F9DADF}" dt="2023-04-03T06:39:01.331" v="20" actId="20577"/>
+          <ac:spMkLst>
+            <pc:docMk/>
+            <pc:sldMk cId="326879574" sldId="269"/>
+            <ac:spMk id="139" creationId="{9D3B4A95-D472-475F-9FE1-BE2E2830190F}"/>
+          </ac:spMkLst>
+        </pc:spChg>
+        <pc:cxnChg chg="mod">
+          <ac:chgData name="Rebecca Fisher" userId="dff23cd4-a77e-4150-9530-955e6070e532" providerId="ADAL" clId="{DE98530D-7C18-46D1-A921-E78294F9DADF}" dt="2023-04-03T06:39:46.627" v="24" actId="12788"/>
+          <ac:cxnSpMkLst>
+            <pc:docMk/>
+            <pc:sldMk cId="326879574" sldId="269"/>
+            <ac:cxnSpMk id="3" creationId="{D1DC6E69-95A4-241F-60D6-1F1E2E428B95}"/>
+          </ac:cxnSpMkLst>
+        </pc:cxnChg>
+        <pc:cxnChg chg="mod">
+          <ac:chgData name="Rebecca Fisher" userId="dff23cd4-a77e-4150-9530-955e6070e532" providerId="ADAL" clId="{DE98530D-7C18-46D1-A921-E78294F9DADF}" dt="2023-04-03T06:39:46.627" v="24" actId="12788"/>
+          <ac:cxnSpMkLst>
+            <pc:docMk/>
+            <pc:sldMk cId="326879574" sldId="269"/>
+            <ac:cxnSpMk id="27" creationId="{B9AE1414-C391-E598-FB78-AA81D090DBB6}"/>
+          </ac:cxnSpMkLst>
+        </pc:cxnChg>
+      </pc:sldChg>
+    </pc:docChg>
+  </pc:docChgLst>
+</pc:chgInfo>
 </file>
 
 <file path=ppt/notesMasters/notesMaster1.xml><?xml version="1.0" encoding="utf-8"?>
@@ -205,7 +274,7 @@
           <a:p>
             <a:fld id="{F028E0AB-E65C-468B-AC52-4A8F14B83227}" type="datetimeFigureOut">
               <a:rPr lang="en-AU" smtClean="0"/>
-              <a:t>3/03/2023</a:t>
+              <a:t>3/04/2023</a:t>
             </a:fld>
             <a:endParaRPr lang="en-AU"/>
           </a:p>
@@ -688,7 +757,7 @@
           <a:p>
             <a:fld id="{FFD072AD-E937-461D-82FF-29EE7C74AD6A}" type="datetimeFigureOut">
               <a:rPr lang="en-AU" smtClean="0"/>
-              <a:t>3/03/2023</a:t>
+              <a:t>3/04/2023</a:t>
             </a:fld>
             <a:endParaRPr lang="en-AU"/>
           </a:p>
@@ -858,7 +927,7 @@
           <a:p>
             <a:fld id="{FFD072AD-E937-461D-82FF-29EE7C74AD6A}" type="datetimeFigureOut">
               <a:rPr lang="en-AU" smtClean="0"/>
-              <a:t>3/03/2023</a:t>
+              <a:t>3/04/2023</a:t>
             </a:fld>
             <a:endParaRPr lang="en-AU"/>
           </a:p>
@@ -1038,7 +1107,7 @@
           <a:p>
             <a:fld id="{FFD072AD-E937-461D-82FF-29EE7C74AD6A}" type="datetimeFigureOut">
               <a:rPr lang="en-AU" smtClean="0"/>
-              <a:t>3/03/2023</a:t>
+              <a:t>3/04/2023</a:t>
             </a:fld>
             <a:endParaRPr lang="en-AU"/>
           </a:p>
@@ -1208,7 +1277,7 @@
           <a:p>
             <a:fld id="{FFD072AD-E937-461D-82FF-29EE7C74AD6A}" type="datetimeFigureOut">
               <a:rPr lang="en-AU" smtClean="0"/>
-              <a:t>3/03/2023</a:t>
+              <a:t>3/04/2023</a:t>
             </a:fld>
             <a:endParaRPr lang="en-AU"/>
           </a:p>
@@ -1454,7 +1523,7 @@
           <a:p>
             <a:fld id="{FFD072AD-E937-461D-82FF-29EE7C74AD6A}" type="datetimeFigureOut">
               <a:rPr lang="en-AU" smtClean="0"/>
-              <a:t>3/03/2023</a:t>
+              <a:t>3/04/2023</a:t>
             </a:fld>
             <a:endParaRPr lang="en-AU"/>
           </a:p>
@@ -1686,7 +1755,7 @@
           <a:p>
             <a:fld id="{FFD072AD-E937-461D-82FF-29EE7C74AD6A}" type="datetimeFigureOut">
               <a:rPr lang="en-AU" smtClean="0"/>
-              <a:t>3/03/2023</a:t>
+              <a:t>3/04/2023</a:t>
             </a:fld>
             <a:endParaRPr lang="en-AU"/>
           </a:p>
@@ -2053,7 +2122,7 @@
           <a:p>
             <a:fld id="{FFD072AD-E937-461D-82FF-29EE7C74AD6A}" type="datetimeFigureOut">
               <a:rPr lang="en-AU" smtClean="0"/>
-              <a:t>3/03/2023</a:t>
+              <a:t>3/04/2023</a:t>
             </a:fld>
             <a:endParaRPr lang="en-AU"/>
           </a:p>
@@ -2171,7 +2240,7 @@
           <a:p>
             <a:fld id="{FFD072AD-E937-461D-82FF-29EE7C74AD6A}" type="datetimeFigureOut">
               <a:rPr lang="en-AU" smtClean="0"/>
-              <a:t>3/03/2023</a:t>
+              <a:t>3/04/2023</a:t>
             </a:fld>
             <a:endParaRPr lang="en-AU"/>
           </a:p>
@@ -2266,7 +2335,7 @@
           <a:p>
             <a:fld id="{FFD072AD-E937-461D-82FF-29EE7C74AD6A}" type="datetimeFigureOut">
               <a:rPr lang="en-AU" smtClean="0"/>
-              <a:t>3/03/2023</a:t>
+              <a:t>3/04/2023</a:t>
             </a:fld>
             <a:endParaRPr lang="en-AU"/>
           </a:p>
@@ -2543,7 +2612,7 @@
           <a:p>
             <a:fld id="{FFD072AD-E937-461D-82FF-29EE7C74AD6A}" type="datetimeFigureOut">
               <a:rPr lang="en-AU" smtClean="0"/>
-              <a:t>3/03/2023</a:t>
+              <a:t>3/04/2023</a:t>
             </a:fld>
             <a:endParaRPr lang="en-AU"/>
           </a:p>
@@ -2800,7 +2869,7 @@
           <a:p>
             <a:fld id="{FFD072AD-E937-461D-82FF-29EE7C74AD6A}" type="datetimeFigureOut">
               <a:rPr lang="en-AU" smtClean="0"/>
-              <a:t>3/03/2023</a:t>
+              <a:t>3/04/2023</a:t>
             </a:fld>
             <a:endParaRPr lang="en-AU"/>
           </a:p>
@@ -3013,7 +3082,7 @@
           <a:p>
             <a:fld id="{FFD072AD-E937-461D-82FF-29EE7C74AD6A}" type="datetimeFigureOut">
               <a:rPr lang="en-AU" smtClean="0"/>
-              <a:t>3/03/2023</a:t>
+              <a:t>3/04/2023</a:t>
             </a:fld>
             <a:endParaRPr lang="en-AU"/>
           </a:p>
@@ -4565,7 +4634,7 @@
                 <a:latin typeface="Arial" panose="020B0604020202020204" pitchFamily="34" charset="0"/>
                 <a:cs typeface="Arial" panose="020B0604020202020204" pitchFamily="34" charset="0"/>
               </a:rPr>
-              <a:t>) NEC model</a:t>
+              <a:t>)</a:t>
             </a:r>
           </a:p>
         </p:txBody>
@@ -4674,7 +4743,7 @@
         <p:spPr bwMode="auto">
           <a:xfrm>
             <a:off x="3364169" y="-35842"/>
-            <a:ext cx="2904962" cy="276998"/>
+            <a:ext cx="397866" cy="276999"/>
           </a:xfrm>
           <a:prstGeom prst="rect">
             <a:avLst/>
@@ -4728,19 +4797,8 @@
                 <a:latin typeface="Arial" panose="020B0604020202020204" pitchFamily="34" charset="0"/>
                 <a:cs typeface="Arial" panose="020B0604020202020204" pitchFamily="34" charset="0"/>
               </a:rPr>
-              <a:t>) Sigmoidal model with estimated </a:t>
-            </a:r>
-            <a:r>
-              <a:rPr lang="en-AU" altLang="en-US" sz="1200" dirty="0" err="1">
-                <a:latin typeface="Arial" panose="020B0604020202020204" pitchFamily="34" charset="0"/>
-                <a:cs typeface="Arial" panose="020B0604020202020204" pitchFamily="34" charset="0"/>
-              </a:rPr>
-              <a:t>ECx</a:t>
-            </a:r>
-            <a:endParaRPr lang="en-AU" altLang="en-US" sz="1200" dirty="0">
-              <a:latin typeface="Arial" panose="020B0604020202020204" pitchFamily="34" charset="0"/>
-              <a:cs typeface="Arial" panose="020B0604020202020204" pitchFamily="34" charset="0"/>
-            </a:endParaRPr>
+              <a:t>)</a:t>
+            </a:r>
           </a:p>
         </p:txBody>
       </p:sp>
@@ -4761,7 +4819,7 @@
         <p:spPr bwMode="auto">
           <a:xfrm>
             <a:off x="3473003" y="1606644"/>
-            <a:ext cx="1574470" cy="276999"/>
+            <a:ext cx="397866" cy="276999"/>
           </a:xfrm>
           <a:prstGeom prst="rect">
             <a:avLst/>
@@ -4815,7 +4873,7 @@
                 <a:latin typeface="Arial" panose="020B0604020202020204" pitchFamily="34" charset="0"/>
                 <a:cs typeface="Arial" panose="020B0604020202020204" pitchFamily="34" charset="0"/>
               </a:rPr>
-              <a:t>) NSEC derivation</a:t>
+              <a:t>)</a:t>
             </a:r>
           </a:p>
         </p:txBody>
@@ -5529,7 +5587,7 @@
         <p:spPr bwMode="auto">
           <a:xfrm>
             <a:off x="228117" y="1606644"/>
-            <a:ext cx="1592103" cy="276999"/>
+            <a:ext cx="397866" cy="276999"/>
           </a:xfrm>
           <a:prstGeom prst="rect">
             <a:avLst/>
@@ -5583,7 +5641,7 @@
                 <a:latin typeface="Arial" panose="020B0604020202020204" pitchFamily="34" charset="0"/>
                 <a:cs typeface="Arial" panose="020B0604020202020204" pitchFamily="34" charset="0"/>
               </a:rPr>
-              <a:t>) NOEC derivation</a:t>
+              <a:t>)</a:t>
             </a:r>
           </a:p>
         </p:txBody>
@@ -5944,7 +6002,7 @@
         </p:nvCxnSpPr>
         <p:spPr>
           <a:xfrm>
-            <a:off x="1194522" y="2002899"/>
+            <a:off x="1194530" y="2002899"/>
             <a:ext cx="0" cy="296681"/>
           </a:xfrm>
           <a:prstGeom prst="line">
@@ -6911,7 +6969,7 @@
         </p:nvCxnSpPr>
         <p:spPr>
           <a:xfrm>
-            <a:off x="1199251" y="2238954"/>
+            <a:off x="1194530" y="2238954"/>
             <a:ext cx="0" cy="1068330"/>
           </a:xfrm>
           <a:prstGeom prst="line">

</xml_diff>